<commit_message>
Poster updated with corrected colors
</commit_message>
<xml_diff>
--- a/Documentation/Poster.pptx
+++ b/Documentation/Poster.pptx
@@ -4359,30 +4359,6 @@
           </a:graphicData>
         </a:graphic>
       </p:graphicFrame>
-      <p:pic>
-        <p:nvPicPr>
-          <p:cNvPr id="6" name="Picture 5"/>
-          <p:cNvPicPr>
-            <a:picLocks noChangeAspect="1"/>
-          </p:cNvPicPr>
-          <p:nvPr/>
-        </p:nvPicPr>
-        <p:blipFill>
-          <a:blip r:embed="rId14"/>
-          <a:stretch>
-            <a:fillRect/>
-          </a:stretch>
-        </p:blipFill>
-        <p:spPr>
-          <a:xfrm>
-            <a:off x="12502074" y="23658444"/>
-            <a:ext cx="8762891" cy="5222329"/>
-          </a:xfrm>
-          <a:prstGeom prst="rect">
-            <a:avLst/>
-          </a:prstGeom>
-        </p:spPr>
-      </p:pic>
       <p:graphicFrame>
         <p:nvGraphicFramePr>
           <p:cNvPr id="9" name="Table 8"/>
@@ -4720,6 +4696,30 @@
           </a:p>
         </p:txBody>
       </p:sp>
+      <p:pic>
+        <p:nvPicPr>
+          <p:cNvPr id="18" name="Picture 17"/>
+          <p:cNvPicPr>
+            <a:picLocks noChangeAspect="1"/>
+          </p:cNvPicPr>
+          <p:nvPr/>
+        </p:nvPicPr>
+        <p:blipFill>
+          <a:blip r:embed="rId14"/>
+          <a:stretch>
+            <a:fillRect/>
+          </a:stretch>
+        </p:blipFill>
+        <p:spPr>
+          <a:xfrm>
+            <a:off x="12740845" y="23895237"/>
+            <a:ext cx="7835385" cy="4669573"/>
+          </a:xfrm>
+          <a:prstGeom prst="rect">
+            <a:avLst/>
+          </a:prstGeom>
+        </p:spPr>
+      </p:pic>
     </p:spTree>
     <p:extLst>
       <p:ext uri="{BB962C8B-B14F-4D97-AF65-F5344CB8AC3E}">
@@ -5372,6 +5372,24 @@
 </file>
 
 <file path=customXml/item1.xml><?xml version="1.0" encoding="utf-8"?>
+<p:properties xmlns:p="http://schemas.microsoft.com/office/2006/metadata/properties" xmlns:xsi="http://www.w3.org/2001/XMLSchema-instance" xmlns:pc="http://schemas.microsoft.com/office/infopath/2007/PartnerControls">
+  <documentManagement>
+    <_Version xmlns="http://schemas.microsoft.com/sharepoint/v3/fields" xsi:nil="true"/>
+    <_Status xmlns="http://schemas.microsoft.com/sharepoint/v3/fields">Not Started</_Status>
+  </documentManagement>
+</p:properties>
+</file>
+
+<file path=customXml/item2.xml><?xml version="1.0" encoding="utf-8"?>
+<?mso-contentType ?>
+<FormTemplates xmlns="http://schemas.microsoft.com/sharepoint/v3/contenttype/forms">
+  <Display>DocumentLibraryForm</Display>
+  <Edit>DocumentLibraryForm</Edit>
+  <New>DocumentLibraryForm</New>
+</FormTemplates>
+</file>
+
+<file path=customXml/item3.xml><?xml version="1.0" encoding="utf-8"?>
 <ct:contentTypeSchema xmlns:ct="http://schemas.microsoft.com/office/2006/metadata/contentType" xmlns:ma="http://schemas.microsoft.com/office/2006/metadata/properties/metaAttributes" ct:_="" ma:_="" ma:contentTypeName="Document" ma:contentTypeID="0x0101000DE64AEEDD9B7A4D93545ACBE97D4615" ma:contentTypeVersion="2" ma:contentTypeDescription="Create a new document." ma:contentTypeScope="" ma:versionID="f49002b78e3a4a71b814eef46a983816">
   <xsd:schema xmlns:xsd="http://www.w3.org/2001/XMLSchema" xmlns:xs="http://www.w3.org/2001/XMLSchema" xmlns:p="http://schemas.microsoft.com/office/2006/metadata/properties" xmlns:ns2="http://schemas.microsoft.com/sharepoint/v3/fields" targetNamespace="http://schemas.microsoft.com/office/2006/metadata/properties" ma:root="true" ma:fieldsID="38f6db2dd0d9a0cf6a8dc37be32b365b" ns2:_="">
     <xsd:import namespace="http://schemas.microsoft.com/sharepoint/v3/fields"/>
@@ -5515,25 +5533,31 @@
 </ct:contentTypeSchema>
 </file>
 
-<file path=customXml/item2.xml><?xml version="1.0" encoding="utf-8"?>
-<?mso-contentType ?>
-<FormTemplates xmlns="http://schemas.microsoft.com/sharepoint/v3/contenttype/forms">
-  <Display>DocumentLibraryForm</Display>
-  <Edit>DocumentLibraryForm</Edit>
-  <New>DocumentLibraryForm</New>
-</FormTemplates>
+<file path=customXml/itemProps1.xml><?xml version="1.0" encoding="utf-8"?>
+<ds:datastoreItem xmlns:ds="http://schemas.openxmlformats.org/officeDocument/2006/customXml" ds:itemID="{7B6F2769-7194-4217-93D3-3AF3A4742282}">
+  <ds:schemaRefs>
+    <ds:schemaRef ds:uri="http://purl.org/dc/terms/"/>
+    <ds:schemaRef ds:uri="http://schemas.openxmlformats.org/package/2006/metadata/core-properties"/>
+    <ds:schemaRef ds:uri="http://schemas.microsoft.com/office/2006/documentManagement/types"/>
+    <ds:schemaRef ds:uri="http://purl.org/dc/dcmitype/"/>
+    <ds:schemaRef ds:uri="http://schemas.microsoft.com/office/infopath/2007/PartnerControls"/>
+    <ds:schemaRef ds:uri="http://purl.org/dc/elements/1.1/"/>
+    <ds:schemaRef ds:uri="http://schemas.microsoft.com/office/2006/metadata/properties"/>
+    <ds:schemaRef ds:uri="http://schemas.microsoft.com/sharepoint/v3/fields"/>
+    <ds:schemaRef ds:uri="http://www.w3.org/XML/1998/namespace"/>
+  </ds:schemaRefs>
+</ds:datastoreItem>
 </file>
 
-<file path=customXml/item3.xml><?xml version="1.0" encoding="utf-8"?>
-<p:properties xmlns:p="http://schemas.microsoft.com/office/2006/metadata/properties" xmlns:xsi="http://www.w3.org/2001/XMLSchema-instance" xmlns:pc="http://schemas.microsoft.com/office/infopath/2007/PartnerControls">
-  <documentManagement>
-    <_Version xmlns="http://schemas.microsoft.com/sharepoint/v3/fields" xsi:nil="true"/>
-    <_Status xmlns="http://schemas.microsoft.com/sharepoint/v3/fields">Not Started</_Status>
-  </documentManagement>
-</p:properties>
+<file path=customXml/itemProps2.xml><?xml version="1.0" encoding="utf-8"?>
+<ds:datastoreItem xmlns:ds="http://schemas.openxmlformats.org/officeDocument/2006/customXml" ds:itemID="{87D2A1B0-FF3E-4009-940D-AED0EB70AA20}">
+  <ds:schemaRefs>
+    <ds:schemaRef ds:uri="http://schemas.microsoft.com/sharepoint/v3/contenttype/forms"/>
+  </ds:schemaRefs>
+</ds:datastoreItem>
 </file>
 
-<file path=customXml/itemProps1.xml><?xml version="1.0" encoding="utf-8"?>
+<file path=customXml/itemProps3.xml><?xml version="1.0" encoding="utf-8"?>
 <ds:datastoreItem xmlns:ds="http://schemas.openxmlformats.org/officeDocument/2006/customXml" ds:itemID="{E4214858-785C-42F7-BE66-6D0E79395FC8}">
   <ds:schemaRefs>
     <ds:schemaRef ds:uri="http://schemas.microsoft.com/office/2006/metadata/contentType"/>
@@ -5549,28 +5573,4 @@
     <ds:schemaRef ds:uri="http://schemas.microsoft.com/internal/obd"/>
   </ds:schemaRefs>
 </ds:datastoreItem>
-</file>
-
-<file path=customXml/itemProps2.xml><?xml version="1.0" encoding="utf-8"?>
-<ds:datastoreItem xmlns:ds="http://schemas.openxmlformats.org/officeDocument/2006/customXml" ds:itemID="{87D2A1B0-FF3E-4009-940D-AED0EB70AA20}">
-  <ds:schemaRefs>
-    <ds:schemaRef ds:uri="http://schemas.microsoft.com/sharepoint/v3/contenttype/forms"/>
-  </ds:schemaRefs>
-</ds:datastoreItem>
-</file>
-
-<file path=customXml/itemProps3.xml><?xml version="1.0" encoding="utf-8"?>
-<ds:datastoreItem xmlns:ds="http://schemas.openxmlformats.org/officeDocument/2006/customXml" ds:itemID="{7B6F2769-7194-4217-93D3-3AF3A4742282}">
-  <ds:schemaRefs>
-    <ds:schemaRef ds:uri="http://purl.org/dc/terms/"/>
-    <ds:schemaRef ds:uri="http://schemas.openxmlformats.org/package/2006/metadata/core-properties"/>
-    <ds:schemaRef ds:uri="http://schemas.microsoft.com/office/2006/documentManagement/types"/>
-    <ds:schemaRef ds:uri="http://purl.org/dc/dcmitype/"/>
-    <ds:schemaRef ds:uri="http://schemas.microsoft.com/office/infopath/2007/PartnerControls"/>
-    <ds:schemaRef ds:uri="http://purl.org/dc/elements/1.1/"/>
-    <ds:schemaRef ds:uri="http://schemas.microsoft.com/office/2006/metadata/properties"/>
-    <ds:schemaRef ds:uri="http://schemas.microsoft.com/sharepoint/v3/fields"/>
-    <ds:schemaRef ds:uri="http://www.w3.org/XML/1998/namespace"/>
-  </ds:schemaRefs>
-</ds:datastoreItem>
 </file>
</xml_diff>